<commit_message>
added dataviz, ppt updated
</commit_message>
<xml_diff>
--- a/html/Kendo UI.pptx
+++ b/html/Kendo UI.pptx
@@ -5,7 +5,7 @@
     <p:sldMasterId id="2147483708" r:id="rId1"/>
   </p:sldMasterIdLst>
   <p:notesMasterIdLst>
-    <p:notesMasterId r:id="rId13"/>
+    <p:notesMasterId r:id="rId15"/>
   </p:notesMasterIdLst>
   <p:sldIdLst>
     <p:sldId id="259" r:id="rId2"/>
@@ -19,6 +19,8 @@
     <p:sldId id="265" r:id="rId10"/>
     <p:sldId id="266" r:id="rId11"/>
     <p:sldId id="267" r:id="rId12"/>
+    <p:sldId id="268" r:id="rId13"/>
+    <p:sldId id="269" r:id="rId14"/>
   </p:sldIdLst>
   <p:sldSz cx="9144000" cy="6858000" type="screen4x3"/>
   <p:notesSz cx="6858000" cy="9144000"/>
@@ -202,7 +204,7 @@
           <a:p>
             <a:fld id="{A3EEF1FE-4C3E-4A42-AC59-1D96E84B9F9E}" type="datetimeFigureOut">
               <a:rPr lang="en-GB" smtClean="0"/>
-              <a:t>08/02/2015</a:t>
+              <a:t>11/02/2015</a:t>
             </a:fld>
             <a:endParaRPr lang="en-GB"/>
           </a:p>
@@ -675,6 +677,140 @@
 </p:notes>
 </file>
 
+<file path=ppt/notesSlides/notesSlide11.xml><?xml version="1.0" encoding="utf-8"?>
+<p:notes xmlns:a="http://schemas.openxmlformats.org/drawingml/2006/main" xmlns:r="http://schemas.openxmlformats.org/officeDocument/2006/relationships" xmlns:p="http://schemas.openxmlformats.org/presentationml/2006/main">
+  <p:cSld>
+    <p:spTree>
+      <p:nvGrpSpPr>
+        <p:cNvPr id="1" name=""/>
+        <p:cNvGrpSpPr/>
+        <p:nvPr/>
+      </p:nvGrpSpPr>
+      <p:grpSpPr>
+        <a:xfrm>
+          <a:off x="0" y="0"/>
+          <a:ext cx="0" cy="0"/>
+          <a:chOff x="0" y="0"/>
+          <a:chExt cx="0" cy="0"/>
+        </a:xfrm>
+      </p:grpSpPr>
+      <p:sp>
+        <p:nvSpPr>
+          <p:cNvPr id="2" name="Slide Image Placeholder 1"/>
+          <p:cNvSpPr>
+            <a:spLocks noGrp="1" noRot="1" noChangeAspect="1"/>
+          </p:cNvSpPr>
+          <p:nvPr>
+            <p:ph type="sldImg"/>
+          </p:nvPr>
+        </p:nvSpPr>
+        <p:spPr/>
+      </p:sp>
+      <p:sp>
+        <p:nvSpPr>
+          <p:cNvPr id="3" name="Notes Placeholder 2"/>
+          <p:cNvSpPr>
+            <a:spLocks noGrp="1"/>
+          </p:cNvSpPr>
+          <p:nvPr>
+            <p:ph type="body" idx="1"/>
+          </p:nvPr>
+        </p:nvSpPr>
+        <p:spPr/>
+        <p:txBody>
+          <a:bodyPr/>
+          <a:lstStyle/>
+          <a:p>
+            <a:r>
+              <a:rPr lang="en-GB" dirty="0" smtClean="0"/>
+              <a:t>Supports</a:t>
+            </a:r>
+            <a:r>
+              <a:rPr lang="en-GB" baseline="0" dirty="0" smtClean="0"/>
+              <a:t> the above series types</a:t>
+            </a:r>
+          </a:p>
+          <a:p>
+            <a:r>
+              <a:rPr lang="en-US" sz="1200" b="0" i="0" kern="1200" dirty="0" smtClean="0">
+                <a:solidFill>
+                  <a:schemeClr val="tx1"/>
+                </a:solidFill>
+                <a:effectLst/>
+                <a:latin typeface="+mn-lt"/>
+                <a:ea typeface="+mn-ea"/>
+                <a:cs typeface="+mn-cs"/>
+              </a:rPr>
+              <a:t>The Chart widget uses modern browser technologies to render high-quality data visualizations. All graphics are rendered on the client using SVG with a fallback to Canvas and VML.	</a:t>
+            </a:r>
+          </a:p>
+          <a:p>
+            <a:r>
+              <a:rPr lang="en-US" sz="1200" b="0" i="0" kern="1200" dirty="0" smtClean="0">
+                <a:solidFill>
+                  <a:schemeClr val="tx1"/>
+                </a:solidFill>
+                <a:effectLst/>
+                <a:latin typeface="+mn-lt"/>
+                <a:ea typeface="+mn-ea"/>
+                <a:cs typeface="+mn-cs"/>
+              </a:rPr>
+              <a:t>can visualize series bound to both local and remote data.</a:t>
+            </a:r>
+          </a:p>
+          <a:p>
+            <a:r>
+              <a:rPr lang="en-US" sz="1200" b="0" i="0" kern="1200" smtClean="0">
+                <a:solidFill>
+                  <a:schemeClr val="tx1"/>
+                </a:solidFill>
+                <a:effectLst/>
+                <a:latin typeface="+mn-lt"/>
+                <a:ea typeface="+mn-ea"/>
+                <a:cs typeface="+mn-cs"/>
+              </a:rPr>
+              <a:t>XY charts such as Scatter and Scatter Line use one or more X and Y axes</a:t>
+            </a:r>
+            <a:endParaRPr lang="en-US" dirty="0"/>
+          </a:p>
+        </p:txBody>
+      </p:sp>
+      <p:sp>
+        <p:nvSpPr>
+          <p:cNvPr id="4" name="Slide Number Placeholder 3"/>
+          <p:cNvSpPr>
+            <a:spLocks noGrp="1"/>
+          </p:cNvSpPr>
+          <p:nvPr>
+            <p:ph type="sldNum" sz="quarter" idx="10"/>
+          </p:nvPr>
+        </p:nvSpPr>
+        <p:spPr/>
+        <p:txBody>
+          <a:bodyPr/>
+          <a:lstStyle/>
+          <a:p>
+            <a:fld id="{DC2CACC7-154D-45B0-B133-967779606221}" type="slidenum">
+              <a:rPr lang="en-GB" smtClean="0"/>
+              <a:t>13</a:t>
+            </a:fld>
+            <a:endParaRPr lang="en-GB"/>
+          </a:p>
+        </p:txBody>
+      </p:sp>
+    </p:spTree>
+    <p:extLst>
+      <p:ext uri="{BB962C8B-B14F-4D97-AF65-F5344CB8AC3E}">
+        <p14:creationId xmlns:p14="http://schemas.microsoft.com/office/powerpoint/2010/main" val="1251524091"/>
+      </p:ext>
+    </p:extLst>
+  </p:cSld>
+  <p:clrMapOvr>
+    <a:masterClrMapping/>
+  </p:clrMapOvr>
+</p:notes>
+</file>
+
 <file path=ppt/notesSlides/notesSlide2.xml><?xml version="1.0" encoding="utf-8"?>
 <p:notes xmlns:a="http://schemas.openxmlformats.org/drawingml/2006/main" xmlns:r="http://schemas.openxmlformats.org/officeDocument/2006/relationships" xmlns:p="http://schemas.openxmlformats.org/presentationml/2006/main">
   <p:cSld>
@@ -1025,11 +1161,7 @@
             </a:pPr>
             <a:r>
               <a:rPr lang="en-US" baseline="0" dirty="0" smtClean="0"/>
-              <a:t>PHP </a:t>
-            </a:r>
-            <a:r>
-              <a:rPr lang="en-US" baseline="0" dirty="0" smtClean="0"/>
-              <a:t>available for web and data </a:t>
+              <a:t>PHP available for web and data </a:t>
             </a:r>
             <a:r>
               <a:rPr lang="en-US" baseline="0" dirty="0" err="1" smtClean="0"/>
@@ -1799,7 +1931,7 @@
           <a:p>
             <a:fld id="{2BE96B4E-485B-4011-B172-D2B8261A77C4}" type="datetimeFigureOut">
               <a:rPr lang="en-GB" smtClean="0"/>
-              <a:t>08/02/2015</a:t>
+              <a:t>11/02/2015</a:t>
             </a:fld>
             <a:endParaRPr lang="en-GB"/>
           </a:p>
@@ -1964,7 +2096,7 @@
           <a:p>
             <a:fld id="{2BE96B4E-485B-4011-B172-D2B8261A77C4}" type="datetimeFigureOut">
               <a:rPr lang="en-GB" smtClean="0"/>
-              <a:t>08/02/2015</a:t>
+              <a:t>11/02/2015</a:t>
             </a:fld>
             <a:endParaRPr lang="en-GB"/>
           </a:p>
@@ -2139,7 +2271,7 @@
           <a:p>
             <a:fld id="{2BE96B4E-485B-4011-B172-D2B8261A77C4}" type="datetimeFigureOut">
               <a:rPr lang="en-GB" smtClean="0"/>
-              <a:t>08/02/2015</a:t>
+              <a:t>11/02/2015</a:t>
             </a:fld>
             <a:endParaRPr lang="en-GB"/>
           </a:p>
@@ -2304,7 +2436,7 @@
           <a:p>
             <a:fld id="{2BE96B4E-485B-4011-B172-D2B8261A77C4}" type="datetimeFigureOut">
               <a:rPr lang="en-GB" smtClean="0"/>
-              <a:t>08/02/2015</a:t>
+              <a:t>11/02/2015</a:t>
             </a:fld>
             <a:endParaRPr lang="en-GB"/>
           </a:p>
@@ -2552,7 +2684,7 @@
           <a:p>
             <a:fld id="{2BE96B4E-485B-4011-B172-D2B8261A77C4}" type="datetimeFigureOut">
               <a:rPr lang="en-GB" smtClean="0"/>
-              <a:t>08/02/2015</a:t>
+              <a:t>11/02/2015</a:t>
             </a:fld>
             <a:endParaRPr lang="en-GB"/>
           </a:p>
@@ -2835,7 +2967,7 @@
           <a:p>
             <a:fld id="{2BE96B4E-485B-4011-B172-D2B8261A77C4}" type="datetimeFigureOut">
               <a:rPr lang="en-GB" smtClean="0"/>
-              <a:t>08/02/2015</a:t>
+              <a:t>11/02/2015</a:t>
             </a:fld>
             <a:endParaRPr lang="en-GB"/>
           </a:p>
@@ -3264,7 +3396,7 @@
           <a:p>
             <a:fld id="{2BE96B4E-485B-4011-B172-D2B8261A77C4}" type="datetimeFigureOut">
               <a:rPr lang="en-GB" smtClean="0"/>
-              <a:t>08/02/2015</a:t>
+              <a:t>11/02/2015</a:t>
             </a:fld>
             <a:endParaRPr lang="en-GB"/>
           </a:p>
@@ -3377,7 +3509,7 @@
           <a:p>
             <a:fld id="{2BE96B4E-485B-4011-B172-D2B8261A77C4}" type="datetimeFigureOut">
               <a:rPr lang="en-GB" smtClean="0"/>
-              <a:t>08/02/2015</a:t>
+              <a:t>11/02/2015</a:t>
             </a:fld>
             <a:endParaRPr lang="en-GB"/>
           </a:p>
@@ -3467,7 +3599,7 @@
           <a:p>
             <a:fld id="{2BE96B4E-485B-4011-B172-D2B8261A77C4}" type="datetimeFigureOut">
               <a:rPr lang="en-GB" smtClean="0"/>
-              <a:t>08/02/2015</a:t>
+              <a:t>11/02/2015</a:t>
             </a:fld>
             <a:endParaRPr lang="en-GB"/>
           </a:p>
@@ -3656,7 +3788,7 @@
           <a:p>
             <a:fld id="{2BE96B4E-485B-4011-B172-D2B8261A77C4}" type="datetimeFigureOut">
               <a:rPr lang="en-GB" smtClean="0"/>
-              <a:t>08/02/2015</a:t>
+              <a:t>11/02/2015</a:t>
             </a:fld>
             <a:endParaRPr lang="en-GB"/>
           </a:p>
@@ -3974,7 +4106,7 @@
           <a:p>
             <a:fld id="{2BE96B4E-485B-4011-B172-D2B8261A77C4}" type="datetimeFigureOut">
               <a:rPr lang="en-GB" smtClean="0"/>
-              <a:t>08/02/2015</a:t>
+              <a:t>11/02/2015</a:t>
             </a:fld>
             <a:endParaRPr lang="en-GB"/>
           </a:p>
@@ -4353,7 +4485,7 @@
           <a:p>
             <a:fld id="{2BE96B4E-485B-4011-B172-D2B8261A77C4}" type="datetimeFigureOut">
               <a:rPr lang="en-GB" smtClean="0"/>
-              <a:t>08/02/2015</a:t>
+              <a:t>11/02/2015</a:t>
             </a:fld>
             <a:endParaRPr lang="en-GB"/>
           </a:p>
@@ -4948,6 +5080,204 @@
 </p:sld>
 </file>
 
+<file path=ppt/slides/slide12.xml><?xml version="1.0" encoding="utf-8"?>
+<p:sld xmlns:a="http://schemas.openxmlformats.org/drawingml/2006/main" xmlns:r="http://schemas.openxmlformats.org/officeDocument/2006/relationships" xmlns:p="http://schemas.openxmlformats.org/presentationml/2006/main">
+  <p:cSld>
+    <p:spTree>
+      <p:nvGrpSpPr>
+        <p:cNvPr id="1" name=""/>
+        <p:cNvGrpSpPr/>
+        <p:nvPr/>
+      </p:nvGrpSpPr>
+      <p:grpSpPr>
+        <a:xfrm>
+          <a:off x="0" y="0"/>
+          <a:ext cx="0" cy="0"/>
+          <a:chOff x="0" y="0"/>
+          <a:chExt cx="0" cy="0"/>
+        </a:xfrm>
+      </p:grpSpPr>
+      <p:sp>
+        <p:nvSpPr>
+          <p:cNvPr id="6" name="Title 5"/>
+          <p:cNvSpPr>
+            <a:spLocks noGrp="1"/>
+          </p:cNvSpPr>
+          <p:nvPr>
+            <p:ph type="title"/>
+          </p:nvPr>
+        </p:nvSpPr>
+        <p:spPr/>
+        <p:txBody>
+          <a:bodyPr/>
+          <a:lstStyle/>
+          <a:p>
+            <a:r>
+              <a:rPr lang="en-GB" dirty="0" smtClean="0"/>
+              <a:t>Data Visualization</a:t>
+            </a:r>
+            <a:endParaRPr lang="en-US" dirty="0"/>
+          </a:p>
+        </p:txBody>
+      </p:sp>
+      <p:sp>
+        <p:nvSpPr>
+          <p:cNvPr id="7" name="Content Placeholder 6"/>
+          <p:cNvSpPr>
+            <a:spLocks noGrp="1"/>
+          </p:cNvSpPr>
+          <p:nvPr>
+            <p:ph idx="1"/>
+          </p:nvPr>
+        </p:nvSpPr>
+        <p:spPr/>
+        <p:txBody>
+          <a:bodyPr/>
+          <a:lstStyle/>
+          <a:p>
+            <a:endParaRPr lang="en-US"/>
+          </a:p>
+        </p:txBody>
+      </p:sp>
+    </p:spTree>
+    <p:extLst>
+      <p:ext uri="{BB962C8B-B14F-4D97-AF65-F5344CB8AC3E}">
+        <p14:creationId xmlns:p14="http://schemas.microsoft.com/office/powerpoint/2010/main" val="2575532285"/>
+      </p:ext>
+    </p:extLst>
+  </p:cSld>
+  <p:clrMapOvr>
+    <a:masterClrMapping/>
+  </p:clrMapOvr>
+</p:sld>
+</file>
+
+<file path=ppt/slides/slide13.xml><?xml version="1.0" encoding="utf-8"?>
+<p:sld xmlns:a="http://schemas.openxmlformats.org/drawingml/2006/main" xmlns:r="http://schemas.openxmlformats.org/officeDocument/2006/relationships" xmlns:p="http://schemas.openxmlformats.org/presentationml/2006/main">
+  <p:cSld>
+    <p:spTree>
+      <p:nvGrpSpPr>
+        <p:cNvPr id="1" name=""/>
+        <p:cNvGrpSpPr/>
+        <p:nvPr/>
+      </p:nvGrpSpPr>
+      <p:grpSpPr>
+        <a:xfrm>
+          <a:off x="0" y="0"/>
+          <a:ext cx="0" cy="0"/>
+          <a:chOff x="0" y="0"/>
+          <a:chExt cx="0" cy="0"/>
+        </a:xfrm>
+      </p:grpSpPr>
+      <p:sp>
+        <p:nvSpPr>
+          <p:cNvPr id="2" name="Title 1"/>
+          <p:cNvSpPr>
+            <a:spLocks noGrp="1"/>
+          </p:cNvSpPr>
+          <p:nvPr>
+            <p:ph type="title"/>
+          </p:nvPr>
+        </p:nvSpPr>
+        <p:spPr/>
+        <p:txBody>
+          <a:bodyPr/>
+          <a:lstStyle/>
+          <a:p>
+            <a:r>
+              <a:rPr lang="en-GB" dirty="0" smtClean="0"/>
+              <a:t>Charts</a:t>
+            </a:r>
+            <a:endParaRPr lang="en-US" dirty="0"/>
+          </a:p>
+        </p:txBody>
+      </p:sp>
+      <p:sp>
+        <p:nvSpPr>
+          <p:cNvPr id="3" name="Content Placeholder 2"/>
+          <p:cNvSpPr>
+            <a:spLocks noGrp="1"/>
+          </p:cNvSpPr>
+          <p:nvPr>
+            <p:ph idx="1"/>
+          </p:nvPr>
+        </p:nvSpPr>
+        <p:spPr/>
+        <p:txBody>
+          <a:bodyPr/>
+          <a:lstStyle/>
+          <a:p>
+            <a:r>
+              <a:rPr lang="en-US" dirty="0"/>
+              <a:t>Bar and Column</a:t>
+            </a:r>
+          </a:p>
+          <a:p>
+            <a:r>
+              <a:rPr lang="en-US" dirty="0"/>
+              <a:t>Line and Vertical Line</a:t>
+            </a:r>
+          </a:p>
+          <a:p>
+            <a:r>
+              <a:rPr lang="en-US" dirty="0"/>
+              <a:t>Area and Vertical Area</a:t>
+            </a:r>
+          </a:p>
+          <a:p>
+            <a:r>
+              <a:rPr lang="en-US" dirty="0"/>
+              <a:t>Bullet</a:t>
+            </a:r>
+          </a:p>
+          <a:p>
+            <a:r>
+              <a:rPr lang="en-US" dirty="0"/>
+              <a:t>Pie and Donut</a:t>
+            </a:r>
+          </a:p>
+          <a:p>
+            <a:r>
+              <a:rPr lang="en-US" dirty="0"/>
+              <a:t>Scatter</a:t>
+            </a:r>
+          </a:p>
+          <a:p>
+            <a:r>
+              <a:rPr lang="en-US" dirty="0"/>
+              <a:t>Scatter Line</a:t>
+            </a:r>
+          </a:p>
+          <a:p>
+            <a:r>
+              <a:rPr lang="en-US" dirty="0"/>
+              <a:t>Bubble</a:t>
+            </a:r>
+          </a:p>
+          <a:p>
+            <a:r>
+              <a:rPr lang="en-US" dirty="0"/>
+              <a:t>Radar and Polar</a:t>
+            </a:r>
+          </a:p>
+          <a:p>
+            <a:endParaRPr lang="en-US" dirty="0"/>
+          </a:p>
+        </p:txBody>
+      </p:sp>
+    </p:spTree>
+    <p:extLst>
+      <p:ext uri="{BB962C8B-B14F-4D97-AF65-F5344CB8AC3E}">
+        <p14:creationId xmlns:p14="http://schemas.microsoft.com/office/powerpoint/2010/main" val="3774403121"/>
+      </p:ext>
+    </p:extLst>
+  </p:cSld>
+  <p:clrMapOvr>
+    <a:masterClrMapping/>
+  </p:clrMapOvr>
+</p:sld>
+</file>
+
 <file path=ppt/slides/slide2.xml><?xml version="1.0" encoding="utf-8"?>
 <p:sld xmlns:a="http://schemas.openxmlformats.org/drawingml/2006/main" xmlns:r="http://schemas.openxmlformats.org/officeDocument/2006/relationships" xmlns:p="http://schemas.openxmlformats.org/presentationml/2006/main">
   <p:cSld>
@@ -5023,7 +5353,6 @@
               <a:rPr lang="en-US" dirty="0" smtClean="0"/>
               <a:t>Overview</a:t>
             </a:r>
-            <a:endParaRPr lang="en-US" dirty="0" smtClean="0"/>
           </a:p>
           <a:p>
             <a:pPr>
@@ -5057,7 +5386,6 @@
               <a:rPr lang="en-US" dirty="0" smtClean="0"/>
               <a:t>Support</a:t>
             </a:r>
-            <a:endParaRPr lang="en-US" dirty="0" smtClean="0"/>
           </a:p>
           <a:p>
             <a:pPr>

</xml_diff>